<commit_message>
updates as per Issue #5
</commit_message>
<xml_diff>
--- a/Whiteboard design session/WDS trainer presentation - Azure Blockchain.pptx
+++ b/Whiteboard design session/WDS trainer presentation - Azure Blockchain.pptx
@@ -483,7 +483,7 @@
           <a:p>
             <a:fld id="{52A13B17-C506-4D51-BB37-16B365906619}" type="datetimeFigureOut">
               <a:rPr lang="en-US" smtClean="0"/>
-              <a:t>6/14/2018</a:t>
+              <a:t>7/13/18</a:t>
             </a:fld>
             <a:endParaRPr lang="en-US" dirty="0"/>
           </a:p>
@@ -1022,7 +1022,10 @@
           <a:bodyPr/>
           <a:lstStyle/>
           <a:p>
-            <a:endParaRPr lang="en-US" dirty="0"/>
+            <a:r>
+              <a:rPr lang="en-US" dirty="0"/>
+              <a:t>The Lambda Architecture design pattern, as used in both Internet of Things and Big Data solutions, enables these solutions to handle massive quantities of data by taking advantage of both Batch processing and Real-Time Stream processing methods within the same solution.</a:t>
+            </a:r>
           </a:p>
           <a:p>
             <a:endParaRPr lang="en-US" dirty="0"/>
@@ -1032,6 +1035,25 @@
               <a:rPr lang="en-US" dirty="0"/>
               <a:t>LINKS:</a:t>
             </a:r>
+          </a:p>
+          <a:p>
+            <a:r>
+              <a:rPr lang="en-US" dirty="0"/>
+              <a:t>https://</a:t>
+            </a:r>
+            <a:r>
+              <a:rPr lang="en-US" dirty="0" err="1"/>
+              <a:t>en.wikipedia.org</a:t>
+            </a:r>
+            <a:r>
+              <a:rPr lang="en-US" dirty="0"/>
+              <a:t>/wiki/</a:t>
+            </a:r>
+            <a:r>
+              <a:rPr lang="en-US" dirty="0" err="1"/>
+              <a:t>Lambda_architecture</a:t>
+            </a:r>
+            <a:endParaRPr lang="en-US" dirty="0"/>
           </a:p>
           <a:p>
             <a:r>
@@ -1124,7 +1146,10 @@
           <a:bodyPr/>
           <a:lstStyle/>
           <a:p>
-            <a:endParaRPr lang="en-US" dirty="0"/>
+            <a:r>
+              <a:rPr lang="en-US" dirty="0"/>
+              <a:t>This is an example of a Blockchain Ledger. When enough transactions in the ledger fill up an entire block, then that block is committed to the Blockchain Ledger in a secure, immutable way that utilizes hashing to ensure security. The block is then distributed across the blockchain network, and each node in the network validates the block.</a:t>
+            </a:r>
           </a:p>
           <a:p>
             <a:endParaRPr lang="en-US" dirty="0"/>
@@ -1726,6 +1751,35 @@
         <p:txBody>
           <a:bodyPr/>
           <a:lstStyle/>
+          <a:p>
+            <a:r>
+              <a:rPr lang="en-US" sz="1200" b="0" i="0" u="none" strike="noStrike" kern="1200" dirty="0">
+                <a:solidFill>
+                  <a:schemeClr val="tx1"/>
+                </a:solidFill>
+                <a:effectLst/>
+                <a:latin typeface="+mn-lt"/>
+                <a:ea typeface="+mn-ea"/>
+                <a:cs typeface="+mn-cs"/>
+              </a:rPr>
+              <a:t>Azure Blockchain Workbench simplifies blockchain application development by providing a solution using several Azure components. Blockchain Workbench can be deployed using a solution template in the Azure Marketplace. The template allows users to pick the modules and components to deploy with Blockchain Workbench, such as blockchain stack, type of client application, and support for IoT integration. </a:t>
+            </a:r>
+            <a:r>
+              <a:rPr lang="en-US" sz="1200" b="0" i="0" u="none" strike="noStrike" kern="1200">
+                <a:solidFill>
+                  <a:schemeClr val="tx1"/>
+                </a:solidFill>
+                <a:effectLst/>
+                <a:latin typeface="+mn-lt"/>
+                <a:ea typeface="+mn-ea"/>
+                <a:cs typeface="+mn-cs"/>
+              </a:rPr>
+              <a:t>Once deployed, Blockchain Workbench provides access to a web app, iOS app, and Android app.</a:t>
+            </a:r>
+          </a:p>
+          <a:p>
+            <a:endParaRPr lang="en-US"/>
+          </a:p>
           <a:p>
             <a:r>
               <a:rPr lang="en-US" dirty="0"/>
@@ -2960,7 +3014,7 @@
                   <a:prstClr val="black"/>
                 </a:solidFill>
               </a:rPr>
-              <a:t>6/14/2018 4:17 PM</a:t>
+              <a:t>7/13/18 3:30 PM</a:t>
             </a:fld>
             <a:endParaRPr lang="en-US" dirty="0">
               <a:solidFill>
@@ -15726,7 +15780,7 @@
         </p:spPr>
         <p:txBody>
           <a:bodyPr>
-            <a:normAutofit lnSpcReduction="10000"/>
+            <a:normAutofit/>
           </a:bodyPr>
           <a:lstStyle/>
           <a:p>
@@ -20682,10 +20736,14 @@
           <a:lstStyle/>
           <a:p>
             <a:r>
+              <a:rPr lang="en-US" sz="2400" dirty="0"/>
+              <a:t>There's a lot of popular interest in Blockchain, and </a:t>
+            </a:r>
+            <a:r>
               <a:rPr lang="en-US" sz="2400" dirty="0">
                 <a:latin typeface="+mn-lt"/>
               </a:rPr>
-              <a:t>There’s tons of buzz about Blockchain, and we only understand enough to know it could be useful. We heard it’s extremely expensive to implement and/or built a POC (Proof of Concept) solution. Is this true?</a:t>
+              <a:t>we only understand enough to know it could be useful. We heard it’s extremely expensive to implement and/or built a POC (Proof of Concept) solution. Is this true?</a:t>
             </a:r>
             <a:br>
               <a:rPr lang="en-US" sz="2400" dirty="0">
@@ -22669,12 +22727,11 @@
           </a:bodyPr>
           <a:lstStyle/>
           <a:p>
-            <a:pPr lvl="0"/>
             <a:r>
               <a:rPr lang="en-US" sz="2800" dirty="0">
                 <a:latin typeface="+mn-lt"/>
               </a:rPr>
-              <a:t>There’s tons of buzz about Blockchain, and we only understand enough to know it could be useful. We heard it’s extremely expensive to implement and/or built a POC (Proof of Concept) solution. Is this true?</a:t>
+              <a:t>There's a lot of popular interest in Blockchain, and we only understand enough to know it could be useful. We heard it’s extremely expensive to implement and/or built a POC (Proof of Concept) solution. Is this true?</a:t>
             </a:r>
             <a:br>
               <a:rPr lang="en-US" sz="2800" dirty="0">
@@ -23850,21 +23907,21 @@
 </file>
 
 <file path=customXml/item2.xml><?xml version="1.0" encoding="utf-8"?>
+<p:properties xmlns:p="http://schemas.microsoft.com/office/2006/metadata/properties" xmlns:xsi="http://www.w3.org/2001/XMLSchema-instance" xmlns:pc="http://schemas.microsoft.com/office/infopath/2007/PartnerControls">
+  <documentManagement>
+    <_ip_UnifiedCompliancePolicyUIAction xmlns="http://schemas.microsoft.com/sharepoint/v3" xsi:nil="true"/>
+    <_ip_UnifiedCompliancePolicyProperties xmlns="http://schemas.microsoft.com/sharepoint/v3" xsi:nil="true"/>
+  </documentManagement>
+</p:properties>
+</file>
+
+<file path=customXml/item3.xml><?xml version="1.0" encoding="utf-8"?>
 <?mso-contentType ?>
 <FormTemplates xmlns="http://schemas.microsoft.com/sharepoint/v3/contenttype/forms">
   <Display>DocumentLibraryForm</Display>
   <Edit>DocumentLibraryForm</Edit>
   <New>DocumentLibraryForm</New>
 </FormTemplates>
-</file>
-
-<file path=customXml/item3.xml><?xml version="1.0" encoding="utf-8"?>
-<p:properties xmlns:p="http://schemas.microsoft.com/office/2006/metadata/properties" xmlns:xsi="http://www.w3.org/2001/XMLSchema-instance" xmlns:pc="http://schemas.microsoft.com/office/infopath/2007/PartnerControls">
-  <documentManagement>
-    <_ip_UnifiedCompliancePolicyUIAction xmlns="http://schemas.microsoft.com/sharepoint/v3" xsi:nil="true"/>
-    <_ip_UnifiedCompliancePolicyProperties xmlns="http://schemas.microsoft.com/sharepoint/v3" xsi:nil="true"/>
-  </documentManagement>
-</p:properties>
 </file>
 
 <file path=customXml/itemProps1.xml><?xml version="1.0" encoding="utf-8"?>
@@ -23888,14 +23945,6 @@
 </file>
 
 <file path=customXml/itemProps2.xml><?xml version="1.0" encoding="utf-8"?>
-<ds:datastoreItem xmlns:ds="http://schemas.openxmlformats.org/officeDocument/2006/customXml" ds:itemID="{F18501AF-04CF-4482-BAE1-607B49DDC378}">
-  <ds:schemaRefs>
-    <ds:schemaRef ds:uri="http://schemas.microsoft.com/sharepoint/v3/contenttype/forms"/>
-  </ds:schemaRefs>
-</ds:datastoreItem>
-</file>
-
-<file path=customXml/itemProps3.xml><?xml version="1.0" encoding="utf-8"?>
 <ds:datastoreItem xmlns:ds="http://schemas.openxmlformats.org/officeDocument/2006/customXml" ds:itemID="{BAF7D529-36AB-45DA-B239-2F912F2D1610}">
   <ds:schemaRefs>
     <ds:schemaRef ds:uri="2023ac63-7b75-4916-a9ee-591457758eee"/>
@@ -23911,4 +23960,12 @@
     <ds:schemaRef ds:uri="http://www.w3.org/XML/1998/namespace"/>
   </ds:schemaRefs>
 </ds:datastoreItem>
+</file>
+
+<file path=customXml/itemProps3.xml><?xml version="1.0" encoding="utf-8"?>
+<ds:datastoreItem xmlns:ds="http://schemas.openxmlformats.org/officeDocument/2006/customXml" ds:itemID="{F18501AF-04CF-4482-BAE1-607B49DDC378}">
+  <ds:schemaRefs>
+    <ds:schemaRef ds:uri="http://schemas.microsoft.com/sharepoint/v3/contenttype/forms"/>
+  </ds:schemaRefs>
+</ds:datastoreItem>
 </file>
</xml_diff>

<commit_message>
added alt-text to images / digrams in trainer presentation pptx
</commit_message>
<xml_diff>
--- a/Whiteboard design session/WDS trainer presentation - Azure Blockchain.pptx
+++ b/Whiteboard design session/WDS trainer presentation - Azure Blockchain.pptx
@@ -483,7 +483,7 @@
           <a:p>
             <a:fld id="{52A13B17-C506-4D51-BB37-16B365906619}" type="datetimeFigureOut">
               <a:rPr lang="en-US" smtClean="0"/>
-              <a:t>10/22/2018</a:t>
+              <a:t>11/12/18</a:t>
             </a:fld>
             <a:endParaRPr lang="en-US" dirty="0"/>
           </a:p>
@@ -2989,7 +2989,7 @@
                   <a:prstClr val="black"/>
                 </a:solidFill>
               </a:rPr>
-              <a:t>10/22/2018 10:37 AM</a:t>
+              <a:t>11/12/18 11:26 AM</a:t>
             </a:fld>
             <a:endParaRPr lang="en-US" dirty="0">
               <a:solidFill>
@@ -15755,7 +15755,7 @@
         </p:spPr>
         <p:txBody>
           <a:bodyPr>
-            <a:normAutofit lnSpcReduction="10000"/>
+            <a:normAutofit/>
           </a:bodyPr>
           <a:lstStyle/>
           <a:p>
@@ -16038,151 +16038,10 @@
       </p:sp>
       <p:pic>
         <p:nvPicPr>
-          <p:cNvPr id="1026" name="Picture 2" descr="https://microsoft.github.io/azure-iot-developer-kit/assets/images/landingpage-get-a-kit.png">
+          <p:cNvPr id="3" name="Picture 2" descr="Common Scenario&#10;IoT / Big Data Lambda Architecture&#10;&#10;The Lambda Architecture design pattern, as used in both Internet of Things and Big Data solutions, enables these solutions to handle massive quantities of data by taking advantage of both Batch processing and Real-Time Stream processing methods within the same solution.&#13;&#10;">
             <a:extLst>
               <a:ext uri="{FF2B5EF4-FFF2-40B4-BE49-F238E27FC236}">
-                <a16:creationId xmlns:a16="http://schemas.microsoft.com/office/drawing/2014/main" id="{61410B2B-1F96-44A0-9405-047AD66C40C0}"/>
-              </a:ext>
-            </a:extLst>
-          </p:cNvPr>
-          <p:cNvPicPr>
-            <a:picLocks noChangeAspect="1" noChangeArrowheads="1"/>
-          </p:cNvPicPr>
-          <p:nvPr/>
-        </p:nvPicPr>
-        <p:blipFill>
-          <a:blip r:embed="rId3" cstate="print">
-            <a:extLst>
-              <a:ext uri="{28A0092B-C50C-407E-A947-70E740481C1C}">
-                <a14:useLocalDpi xmlns:a14="http://schemas.microsoft.com/office/drawing/2010/main" val="0"/>
-              </a:ext>
-            </a:extLst>
-          </a:blip>
-          <a:srcRect/>
-          <a:stretch>
-            <a:fillRect/>
-          </a:stretch>
-        </p:blipFill>
-        <p:spPr bwMode="auto">
-          <a:xfrm>
-            <a:off x="498265" y="4311726"/>
-            <a:ext cx="905355" cy="905355"/>
-          </a:xfrm>
-          <a:prstGeom prst="rect">
-            <a:avLst/>
-          </a:prstGeom>
-          <a:noFill/>
-          <a:extLst>
-            <a:ext uri="{909E8E84-426E-40DD-AFC4-6F175D3DCCD1}">
-              <a14:hiddenFill xmlns:a14="http://schemas.microsoft.com/office/drawing/2010/main">
-                <a:solidFill>
-                  <a:srgbClr val="FFFFFF"/>
-                </a:solidFill>
-              </a14:hiddenFill>
-            </a:ext>
-          </a:extLst>
-        </p:spPr>
-      </p:pic>
-      <p:pic>
-        <p:nvPicPr>
-          <p:cNvPr id="7" name="Picture 2" descr="https://microsoft.github.io/azure-iot-developer-kit/assets/images/landingpage-get-a-kit.png">
-            <a:extLst>
-              <a:ext uri="{FF2B5EF4-FFF2-40B4-BE49-F238E27FC236}">
-                <a16:creationId xmlns:a16="http://schemas.microsoft.com/office/drawing/2014/main" id="{E381E752-6F57-45CB-BD0A-350ECD815FE0}"/>
-              </a:ext>
-            </a:extLst>
-          </p:cNvPr>
-          <p:cNvPicPr>
-            <a:picLocks noChangeAspect="1" noChangeArrowheads="1"/>
-          </p:cNvPicPr>
-          <p:nvPr/>
-        </p:nvPicPr>
-        <p:blipFill>
-          <a:blip r:embed="rId3" cstate="print">
-            <a:extLst>
-              <a:ext uri="{28A0092B-C50C-407E-A947-70E740481C1C}">
-                <a14:useLocalDpi xmlns:a14="http://schemas.microsoft.com/office/drawing/2010/main" val="0"/>
-              </a:ext>
-            </a:extLst>
-          </a:blip>
-          <a:srcRect/>
-          <a:stretch>
-            <a:fillRect/>
-          </a:stretch>
-        </p:blipFill>
-        <p:spPr bwMode="auto">
-          <a:xfrm>
-            <a:off x="498265" y="3297263"/>
-            <a:ext cx="905355" cy="905355"/>
-          </a:xfrm>
-          <a:prstGeom prst="rect">
-            <a:avLst/>
-          </a:prstGeom>
-          <a:noFill/>
-          <a:extLst>
-            <a:ext uri="{909E8E84-426E-40DD-AFC4-6F175D3DCCD1}">
-              <a14:hiddenFill xmlns:a14="http://schemas.microsoft.com/office/drawing/2010/main">
-                <a:solidFill>
-                  <a:srgbClr val="FFFFFF"/>
-                </a:solidFill>
-              </a14:hiddenFill>
-            </a:ext>
-          </a:extLst>
-        </p:spPr>
-      </p:pic>
-      <p:pic>
-        <p:nvPicPr>
-          <p:cNvPr id="8" name="Picture 2" descr="https://microsoft.github.io/azure-iot-developer-kit/assets/images/landingpage-get-a-kit.png">
-            <a:extLst>
-              <a:ext uri="{FF2B5EF4-FFF2-40B4-BE49-F238E27FC236}">
-                <a16:creationId xmlns:a16="http://schemas.microsoft.com/office/drawing/2014/main" id="{69800982-FC5D-40E5-84A5-8257F34107ED}"/>
-              </a:ext>
-            </a:extLst>
-          </p:cNvPr>
-          <p:cNvPicPr>
-            <a:picLocks noChangeAspect="1" noChangeArrowheads="1"/>
-          </p:cNvPicPr>
-          <p:nvPr/>
-        </p:nvPicPr>
-        <p:blipFill>
-          <a:blip r:embed="rId3" cstate="print">
-            <a:extLst>
-              <a:ext uri="{28A0092B-C50C-407E-A947-70E740481C1C}">
-                <a14:useLocalDpi xmlns:a14="http://schemas.microsoft.com/office/drawing/2010/main" val="0"/>
-              </a:ext>
-            </a:extLst>
-          </a:blip>
-          <a:srcRect/>
-          <a:stretch>
-            <a:fillRect/>
-          </a:stretch>
-        </p:blipFill>
-        <p:spPr bwMode="auto">
-          <a:xfrm>
-            <a:off x="498265" y="2320626"/>
-            <a:ext cx="905355" cy="905355"/>
-          </a:xfrm>
-          <a:prstGeom prst="rect">
-            <a:avLst/>
-          </a:prstGeom>
-          <a:noFill/>
-          <a:extLst>
-            <a:ext uri="{909E8E84-426E-40DD-AFC4-6F175D3DCCD1}">
-              <a14:hiddenFill xmlns:a14="http://schemas.microsoft.com/office/drawing/2010/main">
-                <a:solidFill>
-                  <a:srgbClr val="FFFFFF"/>
-                </a:solidFill>
-              </a14:hiddenFill>
-            </a:ext>
-          </a:extLst>
-        </p:spPr>
-      </p:pic>
-      <p:pic>
-        <p:nvPicPr>
-          <p:cNvPr id="11" name="Picture 10">
-            <a:extLst>
-              <a:ext uri="{FF2B5EF4-FFF2-40B4-BE49-F238E27FC236}">
-                <a16:creationId xmlns:a16="http://schemas.microsoft.com/office/drawing/2014/main" id="{84258764-BB9C-40F0-A470-8176A97114B0}"/>
+                <a16:creationId xmlns:a16="http://schemas.microsoft.com/office/drawing/2014/main" id="{D30E82CC-AD67-344E-8CF7-08C70C38641B}"/>
               </a:ext>
             </a:extLst>
           </p:cNvPr>
@@ -16192,681 +16051,15 @@
           <p:nvPr/>
         </p:nvPicPr>
         <p:blipFill>
-          <a:blip r:embed="rId4" cstate="print">
-            <a:extLst>
-              <a:ext uri="{28A0092B-C50C-407E-A947-70E740481C1C}">
-                <a14:useLocalDpi xmlns:a14="http://schemas.microsoft.com/office/drawing/2010/main" val="0"/>
-              </a:ext>
-            </a:extLst>
-          </a:blip>
+          <a:blip r:embed="rId3"/>
           <a:stretch>
             <a:fillRect/>
           </a:stretch>
         </p:blipFill>
         <p:spPr>
           <a:xfrm>
-            <a:off x="2923185" y="3359224"/>
-            <a:ext cx="780290" cy="780290"/>
-          </a:xfrm>
-          <a:prstGeom prst="rect">
-            <a:avLst/>
-          </a:prstGeom>
-        </p:spPr>
-      </p:pic>
-      <p:pic>
-        <p:nvPicPr>
-          <p:cNvPr id="13" name="Picture 12">
-            <a:extLst>
-              <a:ext uri="{FF2B5EF4-FFF2-40B4-BE49-F238E27FC236}">
-                <a16:creationId xmlns:a16="http://schemas.microsoft.com/office/drawing/2014/main" id="{71B97E24-8D04-4E43-9052-A5D7AA59CD8D}"/>
-              </a:ext>
-            </a:extLst>
-          </p:cNvPr>
-          <p:cNvPicPr>
-            <a:picLocks noChangeAspect="1"/>
-          </p:cNvPicPr>
-          <p:nvPr/>
-        </p:nvPicPr>
-        <p:blipFill>
-          <a:blip r:embed="rId5" cstate="print">
-            <a:extLst>
-              <a:ext uri="{28A0092B-C50C-407E-A947-70E740481C1C}">
-                <a14:useLocalDpi xmlns:a14="http://schemas.microsoft.com/office/drawing/2010/main" val="0"/>
-              </a:ext>
-            </a:extLst>
-          </a:blip>
-          <a:stretch>
-            <a:fillRect/>
-          </a:stretch>
-        </p:blipFill>
-        <p:spPr>
-          <a:xfrm>
-            <a:off x="5069766" y="3330244"/>
-            <a:ext cx="780290" cy="780290"/>
-          </a:xfrm>
-          <a:prstGeom prst="rect">
-            <a:avLst/>
-          </a:prstGeom>
-        </p:spPr>
-      </p:pic>
-      <p:pic>
-        <p:nvPicPr>
-          <p:cNvPr id="15" name="Picture 14">
-            <a:extLst>
-              <a:ext uri="{FF2B5EF4-FFF2-40B4-BE49-F238E27FC236}">
-                <a16:creationId xmlns:a16="http://schemas.microsoft.com/office/drawing/2014/main" id="{FBEF5BD8-1CF1-455E-95A0-020DE024968C}"/>
-              </a:ext>
-            </a:extLst>
-          </p:cNvPr>
-          <p:cNvPicPr>
-            <a:picLocks noChangeAspect="1"/>
-          </p:cNvPicPr>
-          <p:nvPr/>
-        </p:nvPicPr>
-        <p:blipFill>
-          <a:blip r:embed="rId6" cstate="print">
-            <a:extLst>
-              <a:ext uri="{28A0092B-C50C-407E-A947-70E740481C1C}">
-                <a14:useLocalDpi xmlns:a14="http://schemas.microsoft.com/office/drawing/2010/main" val="0"/>
-              </a:ext>
-            </a:extLst>
-          </a:blip>
-          <a:stretch>
-            <a:fillRect/>
-          </a:stretch>
-        </p:blipFill>
-        <p:spPr>
-          <a:xfrm>
-            <a:off x="9926832" y="2321275"/>
-            <a:ext cx="780290" cy="780290"/>
-          </a:xfrm>
-          <a:prstGeom prst="rect">
-            <a:avLst/>
-          </a:prstGeom>
-        </p:spPr>
-      </p:pic>
-      <p:pic>
-        <p:nvPicPr>
-          <p:cNvPr id="17" name="Picture 16">
-            <a:extLst>
-              <a:ext uri="{FF2B5EF4-FFF2-40B4-BE49-F238E27FC236}">
-                <a16:creationId xmlns:a16="http://schemas.microsoft.com/office/drawing/2014/main" id="{8CCD6685-1E4E-47C3-9356-C2BD52DA5E92}"/>
-              </a:ext>
-            </a:extLst>
-          </p:cNvPr>
-          <p:cNvPicPr>
-            <a:picLocks noChangeAspect="1"/>
-          </p:cNvPicPr>
-          <p:nvPr/>
-        </p:nvPicPr>
-        <p:blipFill>
-          <a:blip r:embed="rId7" cstate="print">
-            <a:extLst>
-              <a:ext uri="{28A0092B-C50C-407E-A947-70E740481C1C}">
-                <a14:useLocalDpi xmlns:a14="http://schemas.microsoft.com/office/drawing/2010/main" val="0"/>
-              </a:ext>
-            </a:extLst>
-          </a:blip>
-          <a:stretch>
-            <a:fillRect/>
-          </a:stretch>
-        </p:blipFill>
-        <p:spPr>
-          <a:xfrm>
-            <a:off x="9926832" y="5002707"/>
-            <a:ext cx="780290" cy="780290"/>
-          </a:xfrm>
-          <a:prstGeom prst="rect">
-            <a:avLst/>
-          </a:prstGeom>
-        </p:spPr>
-      </p:pic>
-      <p:cxnSp>
-        <p:nvCxnSpPr>
-          <p:cNvPr id="19" name="Straight Arrow Connector 18">
-            <a:extLst>
-              <a:ext uri="{FF2B5EF4-FFF2-40B4-BE49-F238E27FC236}">
-                <a16:creationId xmlns:a16="http://schemas.microsoft.com/office/drawing/2014/main" id="{8E42F080-A43B-4AED-B9EC-3D0CB841A946}"/>
-              </a:ext>
-            </a:extLst>
-          </p:cNvPr>
-          <p:cNvCxnSpPr/>
-          <p:nvPr/>
-        </p:nvCxnSpPr>
-        <p:spPr>
-          <a:xfrm>
-            <a:off x="3815482" y="3742213"/>
-            <a:ext cx="1092017" cy="0"/>
-          </a:xfrm>
-          <a:prstGeom prst="straightConnector1">
-            <a:avLst/>
-          </a:prstGeom>
-          <a:ln w="76200">
-            <a:solidFill>
-              <a:schemeClr val="tx2">
-                <a:lumMod val="25000"/>
-              </a:schemeClr>
-            </a:solidFill>
-            <a:headEnd type="none"/>
-            <a:tailEnd type="triangle"/>
-          </a:ln>
-        </p:spPr>
-        <p:style>
-          <a:lnRef idx="2">
-            <a:schemeClr val="dk1"/>
-          </a:lnRef>
-          <a:fillRef idx="0">
-            <a:schemeClr val="dk1"/>
-          </a:fillRef>
-          <a:effectRef idx="1">
-            <a:schemeClr val="dk1"/>
-          </a:effectRef>
-          <a:fontRef idx="minor">
-            <a:schemeClr val="tx1"/>
-          </a:fontRef>
-        </p:style>
-      </p:cxnSp>
-      <p:cxnSp>
-        <p:nvCxnSpPr>
-          <p:cNvPr id="24" name="Straight Arrow Connector 23">
-            <a:extLst>
-              <a:ext uri="{FF2B5EF4-FFF2-40B4-BE49-F238E27FC236}">
-                <a16:creationId xmlns:a16="http://schemas.microsoft.com/office/drawing/2014/main" id="{69795DB3-1447-446C-A71B-E4F24E2A1FE2}"/>
-              </a:ext>
-            </a:extLst>
-          </p:cNvPr>
-          <p:cNvCxnSpPr/>
-          <p:nvPr/>
-        </p:nvCxnSpPr>
-        <p:spPr>
-          <a:xfrm>
-            <a:off x="1658858" y="3742213"/>
-            <a:ext cx="1092017" cy="0"/>
-          </a:xfrm>
-          <a:prstGeom prst="straightConnector1">
-            <a:avLst/>
-          </a:prstGeom>
-          <a:ln w="76200">
-            <a:solidFill>
-              <a:schemeClr val="tx2">
-                <a:lumMod val="25000"/>
-              </a:schemeClr>
-            </a:solidFill>
-            <a:headEnd type="none"/>
-            <a:tailEnd type="triangle"/>
-          </a:ln>
-        </p:spPr>
-        <p:style>
-          <a:lnRef idx="2">
-            <a:schemeClr val="dk1"/>
-          </a:lnRef>
-          <a:fillRef idx="0">
-            <a:schemeClr val="dk1"/>
-          </a:fillRef>
-          <a:effectRef idx="1">
-            <a:schemeClr val="dk1"/>
-          </a:effectRef>
-          <a:fontRef idx="minor">
-            <a:schemeClr val="tx1"/>
-          </a:fontRef>
-        </p:style>
-      </p:cxnSp>
-      <p:cxnSp>
-        <p:nvCxnSpPr>
-          <p:cNvPr id="25" name="Straight Arrow Connector 24">
-            <a:extLst>
-              <a:ext uri="{FF2B5EF4-FFF2-40B4-BE49-F238E27FC236}">
-                <a16:creationId xmlns:a16="http://schemas.microsoft.com/office/drawing/2014/main" id="{9712E6A1-81D1-47A5-92F6-8B24F8D9F0DF}"/>
-              </a:ext>
-            </a:extLst>
-          </p:cNvPr>
-          <p:cNvCxnSpPr>
-            <a:cxnSpLocks/>
-          </p:cNvCxnSpPr>
-          <p:nvPr/>
-        </p:nvCxnSpPr>
-        <p:spPr>
-          <a:xfrm>
-            <a:off x="1658857" y="2773303"/>
-            <a:ext cx="1209333" cy="556941"/>
-          </a:xfrm>
-          <a:prstGeom prst="straightConnector1">
-            <a:avLst/>
-          </a:prstGeom>
-          <a:ln w="76200">
-            <a:solidFill>
-              <a:schemeClr val="tx2">
-                <a:lumMod val="25000"/>
-              </a:schemeClr>
-            </a:solidFill>
-            <a:headEnd type="none"/>
-            <a:tailEnd type="triangle"/>
-          </a:ln>
-        </p:spPr>
-        <p:style>
-          <a:lnRef idx="2">
-            <a:schemeClr val="dk1"/>
-          </a:lnRef>
-          <a:fillRef idx="0">
-            <a:schemeClr val="dk1"/>
-          </a:fillRef>
-          <a:effectRef idx="1">
-            <a:schemeClr val="dk1"/>
-          </a:effectRef>
-          <a:fontRef idx="minor">
-            <a:schemeClr val="tx1"/>
-          </a:fontRef>
-        </p:style>
-      </p:cxnSp>
-      <p:cxnSp>
-        <p:nvCxnSpPr>
-          <p:cNvPr id="27" name="Straight Arrow Connector 26">
-            <a:extLst>
-              <a:ext uri="{FF2B5EF4-FFF2-40B4-BE49-F238E27FC236}">
-                <a16:creationId xmlns:a16="http://schemas.microsoft.com/office/drawing/2014/main" id="{FC266B25-F672-46D3-9AFE-375AF79B9C32}"/>
-              </a:ext>
-            </a:extLst>
-          </p:cNvPr>
-          <p:cNvCxnSpPr>
-            <a:cxnSpLocks/>
-          </p:cNvCxnSpPr>
-          <p:nvPr/>
-        </p:nvCxnSpPr>
-        <p:spPr>
-          <a:xfrm flipV="1">
-            <a:off x="1658857" y="4202618"/>
-            <a:ext cx="1092018" cy="512104"/>
-          </a:xfrm>
-          <a:prstGeom prst="straightConnector1">
-            <a:avLst/>
-          </a:prstGeom>
-          <a:ln w="76200">
-            <a:solidFill>
-              <a:schemeClr val="tx2">
-                <a:lumMod val="25000"/>
-              </a:schemeClr>
-            </a:solidFill>
-            <a:headEnd type="none"/>
-            <a:tailEnd type="triangle"/>
-          </a:ln>
-        </p:spPr>
-        <p:style>
-          <a:lnRef idx="2">
-            <a:schemeClr val="dk1"/>
-          </a:lnRef>
-          <a:fillRef idx="0">
-            <a:schemeClr val="dk1"/>
-          </a:fillRef>
-          <a:effectRef idx="1">
-            <a:schemeClr val="dk1"/>
-          </a:effectRef>
-          <a:fontRef idx="minor">
-            <a:schemeClr val="tx1"/>
-          </a:fontRef>
-        </p:style>
-      </p:cxnSp>
-      <p:cxnSp>
-        <p:nvCxnSpPr>
-          <p:cNvPr id="29" name="Connector: Elbow 28">
-            <a:extLst>
-              <a:ext uri="{FF2B5EF4-FFF2-40B4-BE49-F238E27FC236}">
-                <a16:creationId xmlns:a16="http://schemas.microsoft.com/office/drawing/2014/main" id="{4C9476F0-1CC2-425C-9D10-EA7D1B13518F}"/>
-              </a:ext>
-            </a:extLst>
-          </p:cNvPr>
-          <p:cNvCxnSpPr>
-            <a:cxnSpLocks/>
-            <a:stCxn id="13" idx="0"/>
-          </p:cNvCxnSpPr>
-          <p:nvPr/>
-        </p:nvCxnSpPr>
-        <p:spPr>
-          <a:xfrm rot="5400000" flipH="1" flipV="1">
-            <a:off x="7376826" y="780239"/>
-            <a:ext cx="633091" cy="4466921"/>
-          </a:xfrm>
-          <a:prstGeom prst="bentConnector2">
-            <a:avLst/>
-          </a:prstGeom>
-          <a:ln w="76200">
-            <a:solidFill>
-              <a:schemeClr val="tx2">
-                <a:lumMod val="25000"/>
-              </a:schemeClr>
-            </a:solidFill>
-            <a:headEnd type="none"/>
-            <a:tailEnd type="triangle"/>
-          </a:ln>
-        </p:spPr>
-        <p:style>
-          <a:lnRef idx="1">
-            <a:schemeClr val="dk1"/>
-          </a:lnRef>
-          <a:fillRef idx="0">
-            <a:schemeClr val="dk1"/>
-          </a:fillRef>
-          <a:effectRef idx="0">
-            <a:schemeClr val="dk1"/>
-          </a:effectRef>
-          <a:fontRef idx="minor">
-            <a:schemeClr val="tx1"/>
-          </a:fontRef>
-        </p:style>
-      </p:cxnSp>
-      <p:cxnSp>
-        <p:nvCxnSpPr>
-          <p:cNvPr id="33" name="Connector: Elbow 32">
-            <a:extLst>
-              <a:ext uri="{FF2B5EF4-FFF2-40B4-BE49-F238E27FC236}">
-                <a16:creationId xmlns:a16="http://schemas.microsoft.com/office/drawing/2014/main" id="{003BC984-3CF6-417B-9B64-C4D8D5017280}"/>
-              </a:ext>
-            </a:extLst>
-          </p:cNvPr>
-          <p:cNvCxnSpPr>
-            <a:cxnSpLocks/>
-          </p:cNvCxnSpPr>
-          <p:nvPr/>
-        </p:nvCxnSpPr>
-        <p:spPr>
-          <a:xfrm>
-            <a:off x="5546129" y="5005086"/>
-            <a:ext cx="4301090" cy="349746"/>
-          </a:xfrm>
-          <a:prstGeom prst="bentConnector3">
-            <a:avLst>
-              <a:gd name="adj1" fmla="val -167"/>
-            </a:avLst>
-          </a:prstGeom>
-          <a:ln w="76200">
-            <a:solidFill>
-              <a:schemeClr val="tx2">
-                <a:lumMod val="25000"/>
-              </a:schemeClr>
-            </a:solidFill>
-            <a:headEnd type="none"/>
-            <a:tailEnd type="triangle"/>
-          </a:ln>
-        </p:spPr>
-        <p:style>
-          <a:lnRef idx="1">
-            <a:schemeClr val="dk1"/>
-          </a:lnRef>
-          <a:fillRef idx="0">
-            <a:schemeClr val="dk1"/>
-          </a:fillRef>
-          <a:effectRef idx="0">
-            <a:schemeClr val="dk1"/>
-          </a:effectRef>
-          <a:fontRef idx="minor">
-            <a:schemeClr val="tx1"/>
-          </a:fontRef>
-        </p:style>
-      </p:cxnSp>
-      <p:sp>
-        <p:nvSpPr>
-          <p:cNvPr id="36" name="TextBox 35">
-            <a:extLst>
-              <a:ext uri="{FF2B5EF4-FFF2-40B4-BE49-F238E27FC236}">
-                <a16:creationId xmlns:a16="http://schemas.microsoft.com/office/drawing/2014/main" id="{438F58DA-EF36-4EFB-99C6-6670F06370A7}"/>
-              </a:ext>
-            </a:extLst>
-          </p:cNvPr>
-          <p:cNvSpPr txBox="1"/>
-          <p:nvPr/>
-        </p:nvSpPr>
-        <p:spPr>
-          <a:xfrm>
-            <a:off x="2708488" y="4044821"/>
-            <a:ext cx="1532771" cy="960263"/>
-          </a:xfrm>
-          <a:prstGeom prst="rect">
-            <a:avLst/>
-          </a:prstGeom>
-          <a:noFill/>
-        </p:spPr>
-        <p:txBody>
-          <a:bodyPr wrap="square" lIns="182880" tIns="146304" rIns="182880" bIns="146304" rtlCol="0">
-            <a:spAutoFit/>
-          </a:bodyPr>
-          <a:lstStyle/>
-          <a:p>
-            <a:pPr>
-              <a:lnSpc>
-                <a:spcPct val="90000"/>
-              </a:lnSpc>
-              <a:spcAft>
-                <a:spcPts val="600"/>
-              </a:spcAft>
-            </a:pPr>
-            <a:r>
-              <a:rPr lang="en-US" sz="2400" dirty="0">
-                <a:solidFill>
-                  <a:schemeClr val="bg1"/>
-                </a:solidFill>
-              </a:rPr>
-              <a:t>Azure IoT Hub</a:t>
-            </a:r>
-          </a:p>
-        </p:txBody>
-      </p:sp>
-      <p:sp>
-        <p:nvSpPr>
-          <p:cNvPr id="38" name="TextBox 37">
-            <a:extLst>
-              <a:ext uri="{FF2B5EF4-FFF2-40B4-BE49-F238E27FC236}">
-                <a16:creationId xmlns:a16="http://schemas.microsoft.com/office/drawing/2014/main" id="{2611E653-7371-43D9-AB98-FA757232CA14}"/>
-              </a:ext>
-            </a:extLst>
-          </p:cNvPr>
-          <p:cNvSpPr txBox="1"/>
-          <p:nvPr/>
-        </p:nvSpPr>
-        <p:spPr>
-          <a:xfrm>
-            <a:off x="236894" y="5273164"/>
-            <a:ext cx="2026629" cy="627864"/>
-          </a:xfrm>
-          <a:prstGeom prst="rect">
-            <a:avLst/>
-          </a:prstGeom>
-          <a:noFill/>
-        </p:spPr>
-        <p:txBody>
-          <a:bodyPr wrap="square" lIns="182880" tIns="146304" rIns="182880" bIns="146304" rtlCol="0">
-            <a:spAutoFit/>
-          </a:bodyPr>
-          <a:lstStyle/>
-          <a:p>
-            <a:pPr>
-              <a:lnSpc>
-                <a:spcPct val="90000"/>
-              </a:lnSpc>
-              <a:spcAft>
-                <a:spcPts val="600"/>
-              </a:spcAft>
-            </a:pPr>
-            <a:r>
-              <a:rPr lang="en-US" sz="2400" dirty="0">
-                <a:solidFill>
-                  <a:schemeClr val="bg1"/>
-                </a:solidFill>
-              </a:rPr>
-              <a:t>IoT Devices</a:t>
-            </a:r>
-          </a:p>
-        </p:txBody>
-      </p:sp>
-      <p:sp>
-        <p:nvSpPr>
-          <p:cNvPr id="39" name="TextBox 38">
-            <a:extLst>
-              <a:ext uri="{FF2B5EF4-FFF2-40B4-BE49-F238E27FC236}">
-                <a16:creationId xmlns:a16="http://schemas.microsoft.com/office/drawing/2014/main" id="{339CB94B-B710-4F9A-81EC-E582CA32F7B7}"/>
-              </a:ext>
-            </a:extLst>
-          </p:cNvPr>
-          <p:cNvSpPr txBox="1"/>
-          <p:nvPr/>
-        </p:nvSpPr>
-        <p:spPr>
-          <a:xfrm>
-            <a:off x="4907499" y="4020546"/>
-            <a:ext cx="1532771" cy="960263"/>
-          </a:xfrm>
-          <a:prstGeom prst="rect">
-            <a:avLst/>
-          </a:prstGeom>
-          <a:noFill/>
-        </p:spPr>
-        <p:txBody>
-          <a:bodyPr wrap="square" lIns="182880" tIns="146304" rIns="182880" bIns="146304" rtlCol="0">
-            <a:spAutoFit/>
-          </a:bodyPr>
-          <a:lstStyle/>
-          <a:p>
-            <a:pPr>
-              <a:lnSpc>
-                <a:spcPct val="90000"/>
-              </a:lnSpc>
-              <a:spcAft>
-                <a:spcPts val="600"/>
-              </a:spcAft>
-            </a:pPr>
-            <a:r>
-              <a:rPr lang="en-US" sz="2400" dirty="0">
-                <a:solidFill>
-                  <a:schemeClr val="bg1"/>
-                </a:solidFill>
-              </a:rPr>
-              <a:t>Stream Analytics</a:t>
-            </a:r>
-          </a:p>
-        </p:txBody>
-      </p:sp>
-      <p:sp>
-        <p:nvSpPr>
-          <p:cNvPr id="40" name="TextBox 39">
-            <a:extLst>
-              <a:ext uri="{FF2B5EF4-FFF2-40B4-BE49-F238E27FC236}">
-                <a16:creationId xmlns:a16="http://schemas.microsoft.com/office/drawing/2014/main" id="{6ADA6F56-CD90-47AD-9FD9-8350D1ED3891}"/>
-              </a:ext>
-            </a:extLst>
-          </p:cNvPr>
-          <p:cNvSpPr txBox="1"/>
-          <p:nvPr/>
-        </p:nvSpPr>
-        <p:spPr>
-          <a:xfrm>
-            <a:off x="6509742" y="5303814"/>
-            <a:ext cx="3492792" cy="960263"/>
-          </a:xfrm>
-          <a:prstGeom prst="rect">
-            <a:avLst/>
-          </a:prstGeom>
-          <a:noFill/>
-        </p:spPr>
-        <p:txBody>
-          <a:bodyPr wrap="square" lIns="182880" tIns="146304" rIns="182880" bIns="146304" rtlCol="0">
-            <a:spAutoFit/>
-          </a:bodyPr>
-          <a:lstStyle/>
-          <a:p>
-            <a:pPr>
-              <a:lnSpc>
-                <a:spcPct val="90000"/>
-              </a:lnSpc>
-              <a:spcAft>
-                <a:spcPts val="600"/>
-              </a:spcAft>
-            </a:pPr>
-            <a:r>
-              <a:rPr lang="en-US" sz="2400" dirty="0">
-                <a:solidFill>
-                  <a:schemeClr val="bg1"/>
-                </a:solidFill>
-              </a:rPr>
-              <a:t>Real-Time Processing and Analytics</a:t>
-            </a:r>
-          </a:p>
-        </p:txBody>
-      </p:sp>
-      <p:sp>
-        <p:nvSpPr>
-          <p:cNvPr id="41" name="TextBox 40">
-            <a:extLst>
-              <a:ext uri="{FF2B5EF4-FFF2-40B4-BE49-F238E27FC236}">
-                <a16:creationId xmlns:a16="http://schemas.microsoft.com/office/drawing/2014/main" id="{8DDCBDE6-E731-40E9-9A07-8ADB5C6AFABD}"/>
-              </a:ext>
-            </a:extLst>
-          </p:cNvPr>
-          <p:cNvSpPr txBox="1"/>
-          <p:nvPr/>
-        </p:nvSpPr>
-        <p:spPr>
-          <a:xfrm>
-            <a:off x="7199404" y="2054181"/>
-            <a:ext cx="2725110" cy="627864"/>
-          </a:xfrm>
-          <a:prstGeom prst="rect">
-            <a:avLst/>
-          </a:prstGeom>
-          <a:noFill/>
-        </p:spPr>
-        <p:txBody>
-          <a:bodyPr wrap="square" lIns="182880" tIns="146304" rIns="182880" bIns="146304" rtlCol="0">
-            <a:spAutoFit/>
-          </a:bodyPr>
-          <a:lstStyle/>
-          <a:p>
-            <a:pPr>
-              <a:lnSpc>
-                <a:spcPct val="90000"/>
-              </a:lnSpc>
-              <a:spcAft>
-                <a:spcPts val="600"/>
-              </a:spcAft>
-            </a:pPr>
-            <a:r>
-              <a:rPr lang="en-US" sz="2400" dirty="0">
-                <a:solidFill>
-                  <a:schemeClr val="bg1"/>
-                </a:solidFill>
-              </a:rPr>
-              <a:t>Batch Processing</a:t>
-            </a:r>
-          </a:p>
-        </p:txBody>
-      </p:sp>
-      <p:pic>
-        <p:nvPicPr>
-          <p:cNvPr id="51" name="Picture 50">
-            <a:extLst>
-              <a:ext uri="{FF2B5EF4-FFF2-40B4-BE49-F238E27FC236}">
-                <a16:creationId xmlns:a16="http://schemas.microsoft.com/office/drawing/2014/main" id="{C1245CA9-986B-4806-BD9D-6AC9DCF9488F}"/>
-              </a:ext>
-            </a:extLst>
-          </p:cNvPr>
-          <p:cNvPicPr>
-            <a:picLocks noChangeAspect="1"/>
-          </p:cNvPicPr>
-          <p:nvPr/>
-        </p:nvPicPr>
-        <p:blipFill>
-          <a:blip r:embed="rId8" cstate="print">
-            <a:extLst>
-              <a:ext uri="{28A0092B-C50C-407E-A947-70E740481C1C}">
-                <a14:useLocalDpi xmlns:a14="http://schemas.microsoft.com/office/drawing/2010/main" val="0"/>
-              </a:ext>
-            </a:extLst>
-          </a:blip>
-          <a:stretch>
-            <a:fillRect/>
-          </a:stretch>
-        </p:blipFill>
-        <p:spPr>
-          <a:xfrm>
-            <a:off x="10965798" y="5010931"/>
-            <a:ext cx="780290" cy="780290"/>
+            <a:off x="269240" y="1989165"/>
+            <a:ext cx="11722975" cy="4497959"/>
           </a:xfrm>
           <a:prstGeom prst="rect">
             <a:avLst/>
@@ -17055,7 +16248,7 @@
       </p:sp>
       <p:pic>
         <p:nvPicPr>
-          <p:cNvPr id="26" name="Picture 25" descr="Blockchain">
+          <p:cNvPr id="26" name="Picture 25" descr="This is an example of a Blockchain Ledger. When enough transactions in the ledger fill up an entire block, then that block is committed to the Blockchain Ledger in a secure, immutable way that utilizes hashing to ensure security. The block is then distributed across the blockchain network, and each node in the network validates the block.&#13;&#10;">
             <a:extLst>
               <a:ext uri="{FF2B5EF4-FFF2-40B4-BE49-F238E27FC236}">
                 <a16:creationId xmlns:a16="http://schemas.microsoft.com/office/drawing/2014/main" id="{99E37ADB-311A-4EC6-AA7A-AB7DA0BE33AB}"/>
@@ -18822,7 +18015,7 @@
       </p:sp>
       <p:pic>
         <p:nvPicPr>
-          <p:cNvPr id="1026" name="Picture 2" descr="Blockchain Workbench Architecture">
+          <p:cNvPr id="1026" name="Picture 2" descr="Azure Blockchain Workbench Architecture">
             <a:extLst>
               <a:ext uri="{FF2B5EF4-FFF2-40B4-BE49-F238E27FC236}">
                 <a16:creationId xmlns:a16="http://schemas.microsoft.com/office/drawing/2014/main" id="{92A82A5E-DC91-4547-A460-92A89D92B55B}"/>
@@ -19594,10 +18787,10 @@
       </p:sp>
       <p:pic>
         <p:nvPicPr>
-          <p:cNvPr id="12" name="Picture 11">
+          <p:cNvPr id="5" name="Picture 4" descr="Preferred Solution&#10;IoT Device Integration&#10;&#10;Workflow diagram showing IoT Device Integration starting with event data from the IoT Devices, flowing through Azure IoT Hub, then to Stream Analytics, then to Azure Service Bus Queue, triggering Logic Apps, then finally passing into the Azure Blockchain Workbench (using Ethereum)">
             <a:extLst>
               <a:ext uri="{FF2B5EF4-FFF2-40B4-BE49-F238E27FC236}">
-                <a16:creationId xmlns:a16="http://schemas.microsoft.com/office/drawing/2014/main" id="{B9222708-EEDC-49F6-A63A-F6D3533427C6}"/>
+                <a16:creationId xmlns:a16="http://schemas.microsoft.com/office/drawing/2014/main" id="{C671BCF7-174F-7049-8761-0CA8E696DE5A}"/>
               </a:ext>
             </a:extLst>
           </p:cNvPr>
@@ -19607,941 +18800,15 @@
           <p:nvPr/>
         </p:nvPicPr>
         <p:blipFill>
-          <a:blip r:embed="rId3" cstate="print">
-            <a:extLst>
-              <a:ext uri="{28A0092B-C50C-407E-A947-70E740481C1C}">
-                <a14:useLocalDpi xmlns:a14="http://schemas.microsoft.com/office/drawing/2010/main" val="0"/>
-              </a:ext>
-            </a:extLst>
-          </a:blip>
+          <a:blip r:embed="rId3"/>
           <a:stretch>
             <a:fillRect/>
           </a:stretch>
         </p:blipFill>
         <p:spPr>
           <a:xfrm>
-            <a:off x="7308412" y="1561216"/>
-            <a:ext cx="1089142" cy="845304"/>
-          </a:xfrm>
-          <a:prstGeom prst="rect">
-            <a:avLst/>
-          </a:prstGeom>
-        </p:spPr>
-      </p:pic>
-      <p:pic>
-        <p:nvPicPr>
-          <p:cNvPr id="13" name="Picture 2" descr="https://microsoft.github.io/azure-iot-developer-kit/assets/images/landingpage-get-a-kit.png">
-            <a:extLst>
-              <a:ext uri="{FF2B5EF4-FFF2-40B4-BE49-F238E27FC236}">
-                <a16:creationId xmlns:a16="http://schemas.microsoft.com/office/drawing/2014/main" id="{1C79122C-904A-4E93-8ED2-26AC29C59785}"/>
-              </a:ext>
-            </a:extLst>
-          </p:cNvPr>
-          <p:cNvPicPr>
-            <a:picLocks noChangeAspect="1" noChangeArrowheads="1"/>
-          </p:cNvPicPr>
-          <p:nvPr/>
-        </p:nvPicPr>
-        <p:blipFill>
-          <a:blip r:embed="rId4" cstate="print">
-            <a:extLst>
-              <a:ext uri="{28A0092B-C50C-407E-A947-70E740481C1C}">
-                <a14:useLocalDpi xmlns:a14="http://schemas.microsoft.com/office/drawing/2010/main" val="0"/>
-              </a:ext>
-            </a:extLst>
-          </a:blip>
-          <a:srcRect/>
-          <a:stretch>
-            <a:fillRect/>
-          </a:stretch>
-        </p:blipFill>
-        <p:spPr bwMode="auto">
-          <a:xfrm>
-            <a:off x="443758" y="4201369"/>
-            <a:ext cx="905355" cy="905355"/>
-          </a:xfrm>
-          <a:prstGeom prst="rect">
-            <a:avLst/>
-          </a:prstGeom>
-          <a:noFill/>
-          <a:extLst>
-            <a:ext uri="{909E8E84-426E-40DD-AFC4-6F175D3DCCD1}">
-              <a14:hiddenFill xmlns:a14="http://schemas.microsoft.com/office/drawing/2010/main">
-                <a:solidFill>
-                  <a:srgbClr val="FFFFFF"/>
-                </a:solidFill>
-              </a14:hiddenFill>
-            </a:ext>
-          </a:extLst>
-        </p:spPr>
-      </p:pic>
-      <p:pic>
-        <p:nvPicPr>
-          <p:cNvPr id="14" name="Picture 13">
-            <a:extLst>
-              <a:ext uri="{FF2B5EF4-FFF2-40B4-BE49-F238E27FC236}">
-                <a16:creationId xmlns:a16="http://schemas.microsoft.com/office/drawing/2014/main" id="{9730BAC1-2831-424E-AFAE-436F0F9D0247}"/>
-              </a:ext>
-            </a:extLst>
-          </p:cNvPr>
-          <p:cNvPicPr>
-            <a:picLocks noChangeAspect="1"/>
-          </p:cNvPicPr>
-          <p:nvPr/>
-        </p:nvPicPr>
-        <p:blipFill>
-          <a:blip r:embed="rId5" cstate="print">
-            <a:extLst>
-              <a:ext uri="{28A0092B-C50C-407E-A947-70E740481C1C}">
-                <a14:useLocalDpi xmlns:a14="http://schemas.microsoft.com/office/drawing/2010/main" val="0"/>
-              </a:ext>
-            </a:extLst>
-          </a:blip>
-          <a:stretch>
-            <a:fillRect/>
-          </a:stretch>
-        </p:blipFill>
-        <p:spPr>
-          <a:xfrm>
-            <a:off x="1487404" y="1567595"/>
-            <a:ext cx="896789" cy="896789"/>
-          </a:xfrm>
-          <a:prstGeom prst="rect">
-            <a:avLst/>
-          </a:prstGeom>
-        </p:spPr>
-      </p:pic>
-      <p:pic>
-        <p:nvPicPr>
-          <p:cNvPr id="15" name="Picture 14">
-            <a:extLst>
-              <a:ext uri="{FF2B5EF4-FFF2-40B4-BE49-F238E27FC236}">
-                <a16:creationId xmlns:a16="http://schemas.microsoft.com/office/drawing/2014/main" id="{9B856D49-44A9-44DC-BDB2-8F2C050A2F03}"/>
-              </a:ext>
-            </a:extLst>
-          </p:cNvPr>
-          <p:cNvPicPr>
-            <a:picLocks noChangeAspect="1"/>
-          </p:cNvPicPr>
-          <p:nvPr/>
-        </p:nvPicPr>
-        <p:blipFill>
-          <a:blip r:embed="rId6" cstate="print">
-            <a:extLst>
-              <a:ext uri="{28A0092B-C50C-407E-A947-70E740481C1C}">
-                <a14:useLocalDpi xmlns:a14="http://schemas.microsoft.com/office/drawing/2010/main" val="0"/>
-              </a:ext>
-            </a:extLst>
-          </a:blip>
-          <a:stretch>
-            <a:fillRect/>
-          </a:stretch>
-        </p:blipFill>
-        <p:spPr>
-          <a:xfrm>
-            <a:off x="3204131" y="1441656"/>
-            <a:ext cx="1034037" cy="1034037"/>
-          </a:xfrm>
-          <a:prstGeom prst="rect">
-            <a:avLst/>
-          </a:prstGeom>
-        </p:spPr>
-      </p:pic>
-      <p:sp>
-        <p:nvSpPr>
-          <p:cNvPr id="18" name="TextBox 17">
-            <a:extLst>
-              <a:ext uri="{FF2B5EF4-FFF2-40B4-BE49-F238E27FC236}">
-                <a16:creationId xmlns:a16="http://schemas.microsoft.com/office/drawing/2014/main" id="{E48B956A-EACE-4E58-BCDB-BF292EBF1378}"/>
-              </a:ext>
-            </a:extLst>
-          </p:cNvPr>
-          <p:cNvSpPr txBox="1"/>
-          <p:nvPr/>
-        </p:nvSpPr>
-        <p:spPr>
-          <a:xfrm>
-            <a:off x="1210283" y="2341382"/>
-            <a:ext cx="1565663" cy="960263"/>
-          </a:xfrm>
-          <a:prstGeom prst="rect">
-            <a:avLst/>
-          </a:prstGeom>
-          <a:noFill/>
-        </p:spPr>
-        <p:txBody>
-          <a:bodyPr wrap="square" lIns="182880" tIns="146304" rIns="182880" bIns="146304" rtlCol="0">
-            <a:spAutoFit/>
-          </a:bodyPr>
-          <a:lstStyle/>
-          <a:p>
-            <a:pPr>
-              <a:lnSpc>
-                <a:spcPct val="90000"/>
-              </a:lnSpc>
-              <a:spcAft>
-                <a:spcPts val="600"/>
-              </a:spcAft>
-            </a:pPr>
-            <a:r>
-              <a:rPr lang="en-US" sz="2400" dirty="0">
-                <a:solidFill>
-                  <a:schemeClr val="tx2">
-                    <a:lumMod val="25000"/>
-                  </a:schemeClr>
-                </a:solidFill>
-              </a:rPr>
-              <a:t>Azure IoT Hub</a:t>
-            </a:r>
-          </a:p>
-        </p:txBody>
-      </p:sp>
-      <p:sp>
-        <p:nvSpPr>
-          <p:cNvPr id="19" name="TextBox 18">
-            <a:extLst>
-              <a:ext uri="{FF2B5EF4-FFF2-40B4-BE49-F238E27FC236}">
-                <a16:creationId xmlns:a16="http://schemas.microsoft.com/office/drawing/2014/main" id="{32909A44-CA76-4072-8FCF-127CC6DAA13D}"/>
-              </a:ext>
-            </a:extLst>
-          </p:cNvPr>
-          <p:cNvSpPr txBox="1"/>
-          <p:nvPr/>
-        </p:nvSpPr>
-        <p:spPr>
-          <a:xfrm>
-            <a:off x="3140012" y="2341381"/>
-            <a:ext cx="1565663" cy="960263"/>
-          </a:xfrm>
-          <a:prstGeom prst="rect">
-            <a:avLst/>
-          </a:prstGeom>
-          <a:noFill/>
-        </p:spPr>
-        <p:txBody>
-          <a:bodyPr wrap="square" lIns="182880" tIns="146304" rIns="182880" bIns="146304" rtlCol="0">
-            <a:spAutoFit/>
-          </a:bodyPr>
-          <a:lstStyle/>
-          <a:p>
-            <a:pPr>
-              <a:lnSpc>
-                <a:spcPct val="90000"/>
-              </a:lnSpc>
-              <a:spcAft>
-                <a:spcPts val="600"/>
-              </a:spcAft>
-            </a:pPr>
-            <a:r>
-              <a:rPr lang="en-US" sz="2400" dirty="0">
-                <a:solidFill>
-                  <a:schemeClr val="tx2">
-                    <a:lumMod val="25000"/>
-                  </a:schemeClr>
-                </a:solidFill>
-              </a:rPr>
-              <a:t>Stream Analytics</a:t>
-            </a:r>
-          </a:p>
-        </p:txBody>
-      </p:sp>
-      <p:sp>
-        <p:nvSpPr>
-          <p:cNvPr id="20" name="TextBox 19">
-            <a:extLst>
-              <a:ext uri="{FF2B5EF4-FFF2-40B4-BE49-F238E27FC236}">
-                <a16:creationId xmlns:a16="http://schemas.microsoft.com/office/drawing/2014/main" id="{C8643C2E-2E2B-4E76-B0C5-CA25285B174C}"/>
-              </a:ext>
-            </a:extLst>
-          </p:cNvPr>
-          <p:cNvSpPr txBox="1"/>
-          <p:nvPr/>
-        </p:nvSpPr>
-        <p:spPr>
-          <a:xfrm>
-            <a:off x="838721" y="5040566"/>
-            <a:ext cx="1965631" cy="627864"/>
-          </a:xfrm>
-          <a:prstGeom prst="rect">
-            <a:avLst/>
-          </a:prstGeom>
-          <a:noFill/>
-        </p:spPr>
-        <p:txBody>
-          <a:bodyPr wrap="square" lIns="182880" tIns="146304" rIns="182880" bIns="146304" rtlCol="0">
-            <a:spAutoFit/>
-          </a:bodyPr>
-          <a:lstStyle/>
-          <a:p>
-            <a:pPr>
-              <a:lnSpc>
-                <a:spcPct val="90000"/>
-              </a:lnSpc>
-              <a:spcAft>
-                <a:spcPts val="600"/>
-              </a:spcAft>
-            </a:pPr>
-            <a:r>
-              <a:rPr lang="en-US" sz="2400" dirty="0">
-                <a:solidFill>
-                  <a:schemeClr val="tx2">
-                    <a:lumMod val="25000"/>
-                  </a:schemeClr>
-                </a:solidFill>
-              </a:rPr>
-              <a:t>IoT Devices</a:t>
-            </a:r>
-          </a:p>
-        </p:txBody>
-      </p:sp>
-      <p:sp>
-        <p:nvSpPr>
-          <p:cNvPr id="21" name="TextBox 20">
-            <a:extLst>
-              <a:ext uri="{FF2B5EF4-FFF2-40B4-BE49-F238E27FC236}">
-                <a16:creationId xmlns:a16="http://schemas.microsoft.com/office/drawing/2014/main" id="{3A5E457E-C82C-4858-BFEA-9DB87078DA60}"/>
-              </a:ext>
-            </a:extLst>
-          </p:cNvPr>
-          <p:cNvSpPr txBox="1"/>
-          <p:nvPr/>
-        </p:nvSpPr>
-        <p:spPr>
-          <a:xfrm>
-            <a:off x="4864909" y="2406520"/>
-            <a:ext cx="1890064" cy="960263"/>
-          </a:xfrm>
-          <a:prstGeom prst="rect">
-            <a:avLst/>
-          </a:prstGeom>
-          <a:noFill/>
-        </p:spPr>
-        <p:txBody>
-          <a:bodyPr wrap="square" lIns="182880" tIns="146304" rIns="182880" bIns="146304" rtlCol="0">
-            <a:spAutoFit/>
-          </a:bodyPr>
-          <a:lstStyle/>
-          <a:p>
-            <a:pPr>
-              <a:lnSpc>
-                <a:spcPct val="90000"/>
-              </a:lnSpc>
-              <a:spcAft>
-                <a:spcPts val="600"/>
-              </a:spcAft>
-            </a:pPr>
-            <a:r>
-              <a:rPr lang="en-US" sz="2400" dirty="0">
-                <a:solidFill>
-                  <a:schemeClr val="tx2">
-                    <a:lumMod val="25000"/>
-                  </a:schemeClr>
-                </a:solidFill>
-              </a:rPr>
-              <a:t>Service Bus Queue</a:t>
-            </a:r>
-          </a:p>
-        </p:txBody>
-      </p:sp>
-      <p:sp>
-        <p:nvSpPr>
-          <p:cNvPr id="22" name="TextBox 21">
-            <a:extLst>
-              <a:ext uri="{FF2B5EF4-FFF2-40B4-BE49-F238E27FC236}">
-                <a16:creationId xmlns:a16="http://schemas.microsoft.com/office/drawing/2014/main" id="{F5160A3A-0F00-4E17-8E19-7F009B2E5CE3}"/>
-              </a:ext>
-            </a:extLst>
-          </p:cNvPr>
-          <p:cNvSpPr txBox="1"/>
-          <p:nvPr/>
-        </p:nvSpPr>
-        <p:spPr>
-          <a:xfrm>
-            <a:off x="6907950" y="2406520"/>
-            <a:ext cx="1890065" cy="627864"/>
-          </a:xfrm>
-          <a:prstGeom prst="rect">
-            <a:avLst/>
-          </a:prstGeom>
-          <a:noFill/>
-        </p:spPr>
-        <p:txBody>
-          <a:bodyPr wrap="square" lIns="182880" tIns="146304" rIns="182880" bIns="146304" rtlCol="0">
-            <a:spAutoFit/>
-          </a:bodyPr>
-          <a:lstStyle/>
-          <a:p>
-            <a:pPr>
-              <a:lnSpc>
-                <a:spcPct val="90000"/>
-              </a:lnSpc>
-              <a:spcAft>
-                <a:spcPts val="600"/>
-              </a:spcAft>
-            </a:pPr>
-            <a:r>
-              <a:rPr lang="en-US" sz="2400" dirty="0">
-                <a:solidFill>
-                  <a:schemeClr val="tx2">
-                    <a:lumMod val="25000"/>
-                  </a:schemeClr>
-                </a:solidFill>
-              </a:rPr>
-              <a:t>Logic Apps</a:t>
-            </a:r>
-          </a:p>
-        </p:txBody>
-      </p:sp>
-      <p:sp>
-        <p:nvSpPr>
-          <p:cNvPr id="25" name="Rectangle 24">
-            <a:extLst>
-              <a:ext uri="{FF2B5EF4-FFF2-40B4-BE49-F238E27FC236}">
-                <a16:creationId xmlns:a16="http://schemas.microsoft.com/office/drawing/2014/main" id="{DD48F2C3-02B4-4BBD-B2CD-0B43FA9B0E4F}"/>
-              </a:ext>
-            </a:extLst>
-          </p:cNvPr>
-          <p:cNvSpPr/>
-          <p:nvPr/>
-        </p:nvSpPr>
-        <p:spPr bwMode="auto">
-          <a:xfrm>
-            <a:off x="6107263" y="3558725"/>
-            <a:ext cx="5637703" cy="2868190"/>
-          </a:xfrm>
-          <a:prstGeom prst="rect">
-            <a:avLst/>
-          </a:prstGeom>
-          <a:solidFill>
-            <a:schemeClr val="tx1"/>
-          </a:solidFill>
-          <a:ln w="57150">
-            <a:solidFill>
-              <a:srgbClr val="FFC000"/>
-            </a:solidFill>
-            <a:headEnd type="none" w="med" len="med"/>
-            <a:tailEnd type="none" w="med" len="med"/>
-          </a:ln>
-          <a:effectLst/>
-        </p:spPr>
-        <p:style>
-          <a:lnRef idx="1">
-            <a:schemeClr val="accent2"/>
-          </a:lnRef>
-          <a:fillRef idx="3">
-            <a:schemeClr val="accent2"/>
-          </a:fillRef>
-          <a:effectRef idx="2">
-            <a:schemeClr val="accent2"/>
-          </a:effectRef>
-          <a:fontRef idx="minor">
-            <a:schemeClr val="lt1"/>
-          </a:fontRef>
-        </p:style>
-        <p:txBody>
-          <a:bodyPr rot="0" spcFirstLastPara="0" vertOverflow="overflow" horzOverflow="overflow" vert="horz" wrap="square" lIns="182880" tIns="146304" rIns="182880" bIns="146304" numCol="1" spcCol="0" rtlCol="0" fromWordArt="0" anchor="t" anchorCtr="0" forceAA="0" compatLnSpc="1">
-            <a:prstTxWarp prst="textNoShape">
-              <a:avLst/>
-            </a:prstTxWarp>
-            <a:noAutofit/>
-          </a:bodyPr>
-          <a:lstStyle/>
-          <a:p>
-            <a:pPr algn="ctr" defTabSz="932472" fontAlgn="base">
-              <a:lnSpc>
-                <a:spcPct val="90000"/>
-              </a:lnSpc>
-              <a:spcBef>
-                <a:spcPct val="0"/>
-              </a:spcBef>
-              <a:spcAft>
-                <a:spcPct val="0"/>
-              </a:spcAft>
-            </a:pPr>
-            <a:endParaRPr lang="en-US" sz="2400" dirty="0">
-              <a:gradFill>
-                <a:gsLst>
-                  <a:gs pos="0">
-                    <a:srgbClr val="FFFFFF"/>
-                  </a:gs>
-                  <a:gs pos="100000">
-                    <a:srgbClr val="FFFFFF"/>
-                  </a:gs>
-                </a:gsLst>
-                <a:lin ang="5400000" scaled="0"/>
-              </a:gradFill>
-              <a:ea typeface="Segoe UI" pitchFamily="34" charset="0"/>
-              <a:cs typeface="Segoe UI" pitchFamily="34" charset="0"/>
-            </a:endParaRPr>
-          </a:p>
-        </p:txBody>
-      </p:sp>
-      <p:pic>
-        <p:nvPicPr>
-          <p:cNvPr id="23" name="Picture 2" descr="https://microsoft.github.io/azure-iot-developer-kit/assets/images/landingpage-get-a-kit.png">
-            <a:extLst>
-              <a:ext uri="{FF2B5EF4-FFF2-40B4-BE49-F238E27FC236}">
-                <a16:creationId xmlns:a16="http://schemas.microsoft.com/office/drawing/2014/main" id="{B4AF77D1-B88F-4859-B740-EA5A4DBA88E2}"/>
-              </a:ext>
-            </a:extLst>
-          </p:cNvPr>
-          <p:cNvPicPr>
-            <a:picLocks noChangeAspect="1" noChangeArrowheads="1"/>
-          </p:cNvPicPr>
-          <p:nvPr/>
-        </p:nvPicPr>
-        <p:blipFill>
-          <a:blip r:embed="rId4" cstate="print">
-            <a:extLst>
-              <a:ext uri="{28A0092B-C50C-407E-A947-70E740481C1C}">
-                <a14:useLocalDpi xmlns:a14="http://schemas.microsoft.com/office/drawing/2010/main" val="0"/>
-              </a:ext>
-            </a:extLst>
-          </a:blip>
-          <a:srcRect/>
-          <a:stretch>
-            <a:fillRect/>
-          </a:stretch>
-        </p:blipFill>
-        <p:spPr bwMode="auto">
-          <a:xfrm>
-            <a:off x="1368860" y="4201369"/>
-            <a:ext cx="905355" cy="905355"/>
-          </a:xfrm>
-          <a:prstGeom prst="rect">
-            <a:avLst/>
-          </a:prstGeom>
-          <a:noFill/>
-          <a:extLst>
-            <a:ext uri="{909E8E84-426E-40DD-AFC4-6F175D3DCCD1}">
-              <a14:hiddenFill xmlns:a14="http://schemas.microsoft.com/office/drawing/2010/main">
-                <a:solidFill>
-                  <a:srgbClr val="FFFFFF"/>
-                </a:solidFill>
-              </a14:hiddenFill>
-            </a:ext>
-          </a:extLst>
-        </p:spPr>
-      </p:pic>
-      <p:pic>
-        <p:nvPicPr>
-          <p:cNvPr id="24" name="Picture 2" descr="https://microsoft.github.io/azure-iot-developer-kit/assets/images/landingpage-get-a-kit.png">
-            <a:extLst>
-              <a:ext uri="{FF2B5EF4-FFF2-40B4-BE49-F238E27FC236}">
-                <a16:creationId xmlns:a16="http://schemas.microsoft.com/office/drawing/2014/main" id="{41FFC243-8917-4510-80C5-14ADF8A0B94D}"/>
-              </a:ext>
-            </a:extLst>
-          </p:cNvPr>
-          <p:cNvPicPr>
-            <a:picLocks noChangeAspect="1" noChangeArrowheads="1"/>
-          </p:cNvPicPr>
-          <p:nvPr/>
-        </p:nvPicPr>
-        <p:blipFill>
-          <a:blip r:embed="rId4" cstate="print">
-            <a:extLst>
-              <a:ext uri="{28A0092B-C50C-407E-A947-70E740481C1C}">
-                <a14:useLocalDpi xmlns:a14="http://schemas.microsoft.com/office/drawing/2010/main" val="0"/>
-              </a:ext>
-            </a:extLst>
-          </a:blip>
-          <a:srcRect/>
-          <a:stretch>
-            <a:fillRect/>
-          </a:stretch>
-        </p:blipFill>
-        <p:spPr bwMode="auto">
-          <a:xfrm>
-            <a:off x="2323268" y="4201369"/>
-            <a:ext cx="905355" cy="905355"/>
-          </a:xfrm>
-          <a:prstGeom prst="rect">
-            <a:avLst/>
-          </a:prstGeom>
-          <a:noFill/>
-          <a:extLst>
-            <a:ext uri="{909E8E84-426E-40DD-AFC4-6F175D3DCCD1}">
-              <a14:hiddenFill xmlns:a14="http://schemas.microsoft.com/office/drawing/2010/main">
-                <a:solidFill>
-                  <a:srgbClr val="FFFFFF"/>
-                </a:solidFill>
-              </a14:hiddenFill>
-            </a:ext>
-          </a:extLst>
-        </p:spPr>
-      </p:pic>
-      <p:pic>
-        <p:nvPicPr>
-          <p:cNvPr id="8" name="Picture 7">
-            <a:extLst>
-              <a:ext uri="{FF2B5EF4-FFF2-40B4-BE49-F238E27FC236}">
-                <a16:creationId xmlns:a16="http://schemas.microsoft.com/office/drawing/2014/main" id="{579D631D-F75E-48A9-B48E-E6C8B1CB8691}"/>
-              </a:ext>
-            </a:extLst>
-          </p:cNvPr>
-          <p:cNvPicPr>
-            <a:picLocks noChangeAspect="1"/>
-          </p:cNvPicPr>
-          <p:nvPr/>
-        </p:nvPicPr>
-        <p:blipFill>
-          <a:blip r:embed="rId7">
-            <a:extLst>
-              <a:ext uri="{28A0092B-C50C-407E-A947-70E740481C1C}">
-                <a14:useLocalDpi xmlns:a14="http://schemas.microsoft.com/office/drawing/2010/main" val="0"/>
-              </a:ext>
-            </a:extLst>
-          </a:blip>
-          <a:stretch>
-            <a:fillRect/>
-          </a:stretch>
-        </p:blipFill>
-        <p:spPr>
-          <a:xfrm>
-            <a:off x="6299038" y="3808023"/>
-            <a:ext cx="2066286" cy="2369594"/>
-          </a:xfrm>
-          <a:prstGeom prst="rect">
-            <a:avLst/>
-          </a:prstGeom>
-        </p:spPr>
-      </p:pic>
-      <p:sp>
-        <p:nvSpPr>
-          <p:cNvPr id="26" name="TextBox 25">
-            <a:extLst>
-              <a:ext uri="{FF2B5EF4-FFF2-40B4-BE49-F238E27FC236}">
-                <a16:creationId xmlns:a16="http://schemas.microsoft.com/office/drawing/2014/main" id="{BD681611-6989-41CC-AA52-A6894F84D331}"/>
-              </a:ext>
-            </a:extLst>
-          </p:cNvPr>
-          <p:cNvSpPr txBox="1"/>
-          <p:nvPr/>
-        </p:nvSpPr>
-        <p:spPr>
-          <a:xfrm>
-            <a:off x="8796035" y="4422332"/>
-            <a:ext cx="2751756" cy="1369606"/>
-          </a:xfrm>
-          <a:prstGeom prst="rect">
-            <a:avLst/>
-          </a:prstGeom>
-          <a:noFill/>
-        </p:spPr>
-        <p:txBody>
-          <a:bodyPr wrap="square" lIns="182880" tIns="146304" rIns="182880" bIns="146304" rtlCol="0">
-            <a:spAutoFit/>
-          </a:bodyPr>
-          <a:lstStyle/>
-          <a:p>
-            <a:pPr>
-              <a:lnSpc>
-                <a:spcPct val="90000"/>
-              </a:lnSpc>
-              <a:spcAft>
-                <a:spcPts val="600"/>
-              </a:spcAft>
-            </a:pPr>
-            <a:r>
-              <a:rPr lang="en-US" sz="2400" dirty="0">
-                <a:solidFill>
-                  <a:schemeClr val="tx2">
-                    <a:lumMod val="25000"/>
-                  </a:schemeClr>
-                </a:solidFill>
-              </a:rPr>
-              <a:t>Azure Blockchain Workbench</a:t>
-            </a:r>
-          </a:p>
-          <a:p>
-            <a:pPr>
-              <a:lnSpc>
-                <a:spcPct val="90000"/>
-              </a:lnSpc>
-              <a:spcAft>
-                <a:spcPts val="600"/>
-              </a:spcAft>
-            </a:pPr>
-            <a:r>
-              <a:rPr lang="en-US" sz="2400" dirty="0">
-                <a:solidFill>
-                  <a:schemeClr val="tx2">
-                    <a:lumMod val="25000"/>
-                  </a:schemeClr>
-                </a:solidFill>
-              </a:rPr>
-              <a:t>(using Ethereum)</a:t>
-            </a:r>
-          </a:p>
-        </p:txBody>
-      </p:sp>
-      <p:cxnSp>
-        <p:nvCxnSpPr>
-          <p:cNvPr id="27" name="Straight Arrow Connector 26">
-            <a:extLst>
-              <a:ext uri="{FF2B5EF4-FFF2-40B4-BE49-F238E27FC236}">
-                <a16:creationId xmlns:a16="http://schemas.microsoft.com/office/drawing/2014/main" id="{4F6A8914-A7EE-4AF2-95F5-6D8D0F185445}"/>
-              </a:ext>
-            </a:extLst>
-          </p:cNvPr>
-          <p:cNvCxnSpPr>
-            <a:cxnSpLocks/>
-          </p:cNvCxnSpPr>
-          <p:nvPr/>
-        </p:nvCxnSpPr>
-        <p:spPr>
-          <a:xfrm>
-            <a:off x="2520173" y="2215192"/>
-            <a:ext cx="708450" cy="0"/>
-          </a:xfrm>
-          <a:prstGeom prst="straightConnector1">
-            <a:avLst/>
-          </a:prstGeom>
-          <a:ln w="76200">
-            <a:solidFill>
-              <a:schemeClr val="tx2">
-                <a:lumMod val="25000"/>
-              </a:schemeClr>
-            </a:solidFill>
-            <a:headEnd type="none"/>
-            <a:tailEnd type="triangle"/>
-          </a:ln>
-        </p:spPr>
-        <p:style>
-          <a:lnRef idx="2">
-            <a:schemeClr val="dk1"/>
-          </a:lnRef>
-          <a:fillRef idx="0">
-            <a:schemeClr val="dk1"/>
-          </a:fillRef>
-          <a:effectRef idx="1">
-            <a:schemeClr val="dk1"/>
-          </a:effectRef>
-          <a:fontRef idx="minor">
-            <a:schemeClr val="tx1"/>
-          </a:fontRef>
-        </p:style>
-      </p:cxnSp>
-      <p:cxnSp>
-        <p:nvCxnSpPr>
-          <p:cNvPr id="29" name="Straight Arrow Connector 28">
-            <a:extLst>
-              <a:ext uri="{FF2B5EF4-FFF2-40B4-BE49-F238E27FC236}">
-                <a16:creationId xmlns:a16="http://schemas.microsoft.com/office/drawing/2014/main" id="{A7466169-0171-4414-92DC-771AAFCAFFCA}"/>
-              </a:ext>
-            </a:extLst>
-          </p:cNvPr>
-          <p:cNvCxnSpPr>
-            <a:cxnSpLocks/>
-          </p:cNvCxnSpPr>
-          <p:nvPr/>
-        </p:nvCxnSpPr>
-        <p:spPr>
-          <a:xfrm>
-            <a:off x="4351450" y="2215192"/>
-            <a:ext cx="708450" cy="0"/>
-          </a:xfrm>
-          <a:prstGeom prst="straightConnector1">
-            <a:avLst/>
-          </a:prstGeom>
-          <a:ln w="76200">
-            <a:solidFill>
-              <a:schemeClr val="tx2">
-                <a:lumMod val="25000"/>
-              </a:schemeClr>
-            </a:solidFill>
-            <a:headEnd type="none"/>
-            <a:tailEnd type="triangle"/>
-          </a:ln>
-        </p:spPr>
-        <p:style>
-          <a:lnRef idx="2">
-            <a:schemeClr val="dk1"/>
-          </a:lnRef>
-          <a:fillRef idx="0">
-            <a:schemeClr val="dk1"/>
-          </a:fillRef>
-          <a:effectRef idx="1">
-            <a:schemeClr val="dk1"/>
-          </a:effectRef>
-          <a:fontRef idx="minor">
-            <a:schemeClr val="tx1"/>
-          </a:fontRef>
-        </p:style>
-      </p:cxnSp>
-      <p:cxnSp>
-        <p:nvCxnSpPr>
-          <p:cNvPr id="30" name="Straight Arrow Connector 29">
-            <a:extLst>
-              <a:ext uri="{FF2B5EF4-FFF2-40B4-BE49-F238E27FC236}">
-                <a16:creationId xmlns:a16="http://schemas.microsoft.com/office/drawing/2014/main" id="{66B9EAC6-FAE9-4F55-94DC-15E4D61FEF84}"/>
-              </a:ext>
-            </a:extLst>
-          </p:cNvPr>
-          <p:cNvCxnSpPr>
-            <a:cxnSpLocks/>
-          </p:cNvCxnSpPr>
-          <p:nvPr/>
-        </p:nvCxnSpPr>
-        <p:spPr>
-          <a:xfrm>
-            <a:off x="6415943" y="2249902"/>
-            <a:ext cx="708450" cy="0"/>
-          </a:xfrm>
-          <a:prstGeom prst="straightConnector1">
-            <a:avLst/>
-          </a:prstGeom>
-          <a:ln w="76200">
-            <a:solidFill>
-              <a:schemeClr val="tx2">
-                <a:lumMod val="25000"/>
-              </a:schemeClr>
-            </a:solidFill>
-            <a:headEnd type="none"/>
-            <a:tailEnd type="triangle"/>
-          </a:ln>
-        </p:spPr>
-        <p:style>
-          <a:lnRef idx="2">
-            <a:schemeClr val="dk1"/>
-          </a:lnRef>
-          <a:fillRef idx="0">
-            <a:schemeClr val="dk1"/>
-          </a:fillRef>
-          <a:effectRef idx="1">
-            <a:schemeClr val="dk1"/>
-          </a:effectRef>
-          <a:fontRef idx="minor">
-            <a:schemeClr val="tx1"/>
-          </a:fontRef>
-        </p:style>
-      </p:cxnSp>
-      <p:cxnSp>
-        <p:nvCxnSpPr>
-          <p:cNvPr id="33" name="Connector: Elbow 32">
-            <a:extLst>
-              <a:ext uri="{FF2B5EF4-FFF2-40B4-BE49-F238E27FC236}">
-                <a16:creationId xmlns:a16="http://schemas.microsoft.com/office/drawing/2014/main" id="{6221FA85-BA8C-412A-BBD0-4550B041ADD3}"/>
-              </a:ext>
-            </a:extLst>
-          </p:cNvPr>
-          <p:cNvCxnSpPr>
-            <a:cxnSpLocks/>
-          </p:cNvCxnSpPr>
-          <p:nvPr/>
-        </p:nvCxnSpPr>
-        <p:spPr>
-          <a:xfrm rot="5400000" flipH="1" flipV="1">
-            <a:off x="223566" y="2832442"/>
-            <a:ext cx="1739797" cy="574718"/>
-          </a:xfrm>
-          <a:prstGeom prst="bentConnector2">
-            <a:avLst/>
-          </a:prstGeom>
-          <a:ln w="76200">
-            <a:solidFill>
-              <a:schemeClr val="tx2">
-                <a:lumMod val="25000"/>
-              </a:schemeClr>
-            </a:solidFill>
-            <a:headEnd type="none"/>
-            <a:tailEnd type="triangle"/>
-          </a:ln>
-        </p:spPr>
-        <p:style>
-          <a:lnRef idx="1">
-            <a:schemeClr val="accent1"/>
-          </a:lnRef>
-          <a:fillRef idx="0">
-            <a:schemeClr val="accent1"/>
-          </a:fillRef>
-          <a:effectRef idx="0">
-            <a:schemeClr val="accent1"/>
-          </a:effectRef>
-          <a:fontRef idx="minor">
-            <a:schemeClr val="tx1"/>
-          </a:fontRef>
-        </p:style>
-      </p:cxnSp>
-      <p:cxnSp>
-        <p:nvCxnSpPr>
-          <p:cNvPr id="35" name="Connector: Elbow 34">
-            <a:extLst>
-              <a:ext uri="{FF2B5EF4-FFF2-40B4-BE49-F238E27FC236}">
-                <a16:creationId xmlns:a16="http://schemas.microsoft.com/office/drawing/2014/main" id="{CB033907-90EB-4080-8164-9A3F67DBC74F}"/>
-              </a:ext>
-            </a:extLst>
-          </p:cNvPr>
-          <p:cNvCxnSpPr>
-            <a:cxnSpLocks/>
-          </p:cNvCxnSpPr>
-          <p:nvPr/>
-        </p:nvCxnSpPr>
-        <p:spPr>
-          <a:xfrm rot="16200000" flipV="1">
-            <a:off x="8303130" y="2511702"/>
-            <a:ext cx="1184775" cy="591755"/>
-          </a:xfrm>
-          <a:prstGeom prst="bentConnector3">
-            <a:avLst>
-              <a:gd name="adj1" fmla="val 98862"/>
-            </a:avLst>
-          </a:prstGeom>
-          <a:ln w="76200">
-            <a:solidFill>
-              <a:schemeClr val="tx2">
-                <a:lumMod val="25000"/>
-              </a:schemeClr>
-            </a:solidFill>
-            <a:headEnd type="triangle" w="med" len="med"/>
-            <a:tailEnd type="none" w="med" len="med"/>
-          </a:ln>
-        </p:spPr>
-        <p:style>
-          <a:lnRef idx="1">
-            <a:schemeClr val="accent1"/>
-          </a:lnRef>
-          <a:fillRef idx="0">
-            <a:schemeClr val="accent1"/>
-          </a:fillRef>
-          <a:effectRef idx="0">
-            <a:schemeClr val="accent1"/>
-          </a:effectRef>
-          <a:fontRef idx="minor">
-            <a:schemeClr val="tx1"/>
-          </a:fontRef>
-        </p:style>
-      </p:cxnSp>
-      <p:pic>
-        <p:nvPicPr>
-          <p:cNvPr id="6" name="Picture 5">
-            <a:extLst>
-              <a:ext uri="{FF2B5EF4-FFF2-40B4-BE49-F238E27FC236}">
-                <a16:creationId xmlns:a16="http://schemas.microsoft.com/office/drawing/2014/main" id="{0B2DFF86-2369-440D-9735-0A458710BDC6}"/>
-              </a:ext>
-            </a:extLst>
-          </p:cNvPr>
-          <p:cNvPicPr>
-            <a:picLocks noChangeAspect="1"/>
-          </p:cNvPicPr>
-          <p:nvPr/>
-        </p:nvPicPr>
-        <p:blipFill>
-          <a:blip r:embed="rId8">
-            <a:extLst>
-              <a:ext uri="{28A0092B-C50C-407E-A947-70E740481C1C}">
-                <a14:useLocalDpi xmlns:a14="http://schemas.microsoft.com/office/drawing/2010/main" val="0"/>
-              </a:ext>
-            </a:extLst>
-          </a:blip>
-          <a:stretch>
-            <a:fillRect/>
-          </a:stretch>
-        </p:blipFill>
-        <p:spPr>
-          <a:xfrm>
-            <a:off x="5245935" y="1534578"/>
-            <a:ext cx="929806" cy="929806"/>
+            <a:off x="391160" y="1449695"/>
+            <a:ext cx="11409680" cy="5025535"/>
           </a:xfrm>
           <a:prstGeom prst="rect">
             <a:avLst/>
@@ -23623,15 +21890,6 @@
 </file>
 
 <file path=customXml/item2.xml><?xml version="1.0" encoding="utf-8"?>
-<p:properties xmlns:p="http://schemas.microsoft.com/office/2006/metadata/properties" xmlns:xsi="http://www.w3.org/2001/XMLSchema-instance" xmlns:pc="http://schemas.microsoft.com/office/infopath/2007/PartnerControls">
-  <documentManagement>
-    <_ip_UnifiedCompliancePolicyUIAction xmlns="http://schemas.microsoft.com/sharepoint/v3" xsi:nil="true"/>
-    <_ip_UnifiedCompliancePolicyProperties xmlns="http://schemas.microsoft.com/sharepoint/v3" xsi:nil="true"/>
-  </documentManagement>
-</p:properties>
-</file>
-
-<file path=customXml/item3.xml><?xml version="1.0" encoding="utf-8"?>
 <ct:contentTypeSchema xmlns:ct="http://schemas.microsoft.com/office/2006/metadata/contentType" xmlns:ma="http://schemas.microsoft.com/office/2006/metadata/properties/metaAttributes" ct:_="" ma:_="" ma:contentTypeName="Document" ma:contentTypeID="0x010100D15DFA3690A15B4081582BBCC6BEAC3E" ma:contentTypeVersion="9" ma:contentTypeDescription="Create a new document." ma:contentTypeScope="" ma:versionID="642da1784587cbe85a7fdbbe4dc36103">
   <xsd:schema xmlns:xsd="http://www.w3.org/2001/XMLSchema" xmlns:xs="http://www.w3.org/2001/XMLSchema" xmlns:p="http://schemas.microsoft.com/office/2006/metadata/properties" xmlns:ns1="http://schemas.microsoft.com/sharepoint/v3" xmlns:ns2="2023ac63-7b75-4916-a9ee-591457758eee" xmlns:ns3="d9c797ad-d7c3-4982-82b7-81352a75e4a5" targetNamespace="http://schemas.microsoft.com/office/2006/metadata/properties" ma:root="true" ma:fieldsID="91198b0246576053cc55dd2c67035a89" ns1:_="" ns2:_="" ns3:_="">
     <xsd:import namespace="http://schemas.microsoft.com/sharepoint/v3"/>
@@ -23833,6 +22091,15 @@
 </ct:contentTypeSchema>
 </file>
 
+<file path=customXml/item3.xml><?xml version="1.0" encoding="utf-8"?>
+<p:properties xmlns:p="http://schemas.microsoft.com/office/2006/metadata/properties" xmlns:xsi="http://www.w3.org/2001/XMLSchema-instance" xmlns:pc="http://schemas.microsoft.com/office/infopath/2007/PartnerControls">
+  <documentManagement>
+    <_ip_UnifiedCompliancePolicyUIAction xmlns="http://schemas.microsoft.com/sharepoint/v3" xsi:nil="true"/>
+    <_ip_UnifiedCompliancePolicyProperties xmlns="http://schemas.microsoft.com/sharepoint/v3" xsi:nil="true"/>
+  </documentManagement>
+</p:properties>
+</file>
+
 <file path=customXml/itemProps1.xml><?xml version="1.0" encoding="utf-8"?>
 <ds:datastoreItem xmlns:ds="http://schemas.openxmlformats.org/officeDocument/2006/customXml" ds:itemID="{F18501AF-04CF-4482-BAE1-607B49DDC378}">
   <ds:schemaRefs>
@@ -23842,24 +22109,6 @@
 </file>
 
 <file path=customXml/itemProps2.xml><?xml version="1.0" encoding="utf-8"?>
-<ds:datastoreItem xmlns:ds="http://schemas.openxmlformats.org/officeDocument/2006/customXml" ds:itemID="{BAF7D529-36AB-45DA-B239-2F912F2D1610}">
-  <ds:schemaRefs>
-    <ds:schemaRef ds:uri="2023ac63-7b75-4916-a9ee-591457758eee"/>
-    <ds:schemaRef ds:uri="http://schemas.microsoft.com/office/2006/documentManagement/types"/>
-    <ds:schemaRef ds:uri="http://purl.org/dc/terms/"/>
-    <ds:schemaRef ds:uri="http://schemas.microsoft.com/sharepoint/v3"/>
-    <ds:schemaRef ds:uri="http://purl.org/dc/dcmitype/"/>
-    <ds:schemaRef ds:uri="http://schemas.openxmlformats.org/package/2006/metadata/core-properties"/>
-    <ds:schemaRef ds:uri="http://purl.org/dc/elements/1.1/"/>
-    <ds:schemaRef ds:uri="http://schemas.microsoft.com/office/2006/metadata/properties"/>
-    <ds:schemaRef ds:uri="http://schemas.microsoft.com/office/infopath/2007/PartnerControls"/>
-    <ds:schemaRef ds:uri="d9c797ad-d7c3-4982-82b7-81352a75e4a5"/>
-    <ds:schemaRef ds:uri="http://www.w3.org/XML/1998/namespace"/>
-  </ds:schemaRefs>
-</ds:datastoreItem>
-</file>
-
-<file path=customXml/itemProps3.xml><?xml version="1.0" encoding="utf-8"?>
 <ds:datastoreItem xmlns:ds="http://schemas.openxmlformats.org/officeDocument/2006/customXml" ds:itemID="{255F5BEB-6AD6-480A-8556-C80C5EBC10F2}">
   <ds:schemaRefs>
     <ds:schemaRef ds:uri="http://schemas.microsoft.com/office/2006/metadata/contentType"/>
@@ -23877,4 +22126,22 @@
     <ds:schemaRef ds:uri="http://schemas.microsoft.com/internal/obd"/>
   </ds:schemaRefs>
 </ds:datastoreItem>
+</file>
+
+<file path=customXml/itemProps3.xml><?xml version="1.0" encoding="utf-8"?>
+<ds:datastoreItem xmlns:ds="http://schemas.openxmlformats.org/officeDocument/2006/customXml" ds:itemID="{BAF7D529-36AB-45DA-B239-2F912F2D1610}">
+  <ds:schemaRefs>
+    <ds:schemaRef ds:uri="2023ac63-7b75-4916-a9ee-591457758eee"/>
+    <ds:schemaRef ds:uri="http://schemas.microsoft.com/office/2006/documentManagement/types"/>
+    <ds:schemaRef ds:uri="http://purl.org/dc/terms/"/>
+    <ds:schemaRef ds:uri="http://schemas.microsoft.com/sharepoint/v3"/>
+    <ds:schemaRef ds:uri="http://purl.org/dc/dcmitype/"/>
+    <ds:schemaRef ds:uri="http://schemas.openxmlformats.org/package/2006/metadata/core-properties"/>
+    <ds:schemaRef ds:uri="http://purl.org/dc/elements/1.1/"/>
+    <ds:schemaRef ds:uri="http://schemas.microsoft.com/office/2006/metadata/properties"/>
+    <ds:schemaRef ds:uri="http://schemas.microsoft.com/office/infopath/2007/PartnerControls"/>
+    <ds:schemaRef ds:uri="d9c797ad-d7c3-4982-82b7-81352a75e4a5"/>
+    <ds:schemaRef ds:uri="http://www.w3.org/XML/1998/namespace"/>
+  </ds:schemaRefs>
+</ds:datastoreItem>
 </file>
</xml_diff>